<commit_message>
quick fix on bloom filter save + ptt done
</commit_message>
<xml_diff>
--- a/FinalPitch_MPEI.pptx
+++ b/FinalPitch_MPEI.pptx
@@ -5,7 +5,7 @@
     <p:sldMasterId id="2147483648" r:id="rId1"/>
   </p:sldMasterIdLst>
   <p:notesMasterIdLst>
-    <p:notesMasterId r:id="rId10"/>
+    <p:notesMasterId r:id="rId11"/>
   </p:notesMasterIdLst>
   <p:sldIdLst>
     <p:sldId id="256" r:id="rId2"/>
@@ -16,6 +16,7 @@
     <p:sldId id="261" r:id="rId7"/>
     <p:sldId id="262" r:id="rId8"/>
     <p:sldId id="263" r:id="rId9"/>
+    <p:sldId id="264" r:id="rId10"/>
   </p:sldIdLst>
   <p:sldSz cx="12192000" cy="6858000"/>
   <p:notesSz cx="6858000" cy="9144000"/>
@@ -387,7 +388,7 @@
           <c:showLeaderLines val="1"/>
         </c:dLbls>
         <c:firstSliceAng val="0"/>
-        <c:holeSize val="75"/>
+        <c:holeSize val="64"/>
       </c:doughnutChart>
       <c:spPr>
         <a:noFill/>
@@ -1884,6 +1885,114 @@
 </p:notes>
 </file>
 
+<file path=ppt/notesSlides/notesSlide6.xml><?xml version="1.0" encoding="utf-8"?>
+<p:notes xmlns:a="http://schemas.openxmlformats.org/drawingml/2006/main" xmlns:r="http://schemas.openxmlformats.org/officeDocument/2006/relationships" xmlns:p="http://schemas.openxmlformats.org/presentationml/2006/main">
+  <p:cSld>
+    <p:spTree>
+      <p:nvGrpSpPr>
+        <p:cNvPr id="1" name="">
+          <a:extLst>
+            <a:ext uri="{FF2B5EF4-FFF2-40B4-BE49-F238E27FC236}">
+              <a16:creationId xmlns:a16="http://schemas.microsoft.com/office/drawing/2014/main" id="{21CB5FB4-5D76-A496-7B5A-E2C372C2972C}"/>
+            </a:ext>
+          </a:extLst>
+        </p:cNvPr>
+        <p:cNvGrpSpPr/>
+        <p:nvPr/>
+      </p:nvGrpSpPr>
+      <p:grpSpPr>
+        <a:xfrm>
+          <a:off x="0" y="0"/>
+          <a:ext cx="0" cy="0"/>
+          <a:chOff x="0" y="0"/>
+          <a:chExt cx="0" cy="0"/>
+        </a:xfrm>
+      </p:grpSpPr>
+      <p:sp>
+        <p:nvSpPr>
+          <p:cNvPr id="2" name="Slide Image Placeholder 1">
+            <a:extLst>
+              <a:ext uri="{FF2B5EF4-FFF2-40B4-BE49-F238E27FC236}">
+                <a16:creationId xmlns:a16="http://schemas.microsoft.com/office/drawing/2014/main" id="{17EA3532-5F92-30BC-7026-10B03A8CDD4D}"/>
+              </a:ext>
+            </a:extLst>
+          </p:cNvPr>
+          <p:cNvSpPr>
+            <a:spLocks noGrp="1" noRot="1" noChangeAspect="1"/>
+          </p:cNvSpPr>
+          <p:nvPr>
+            <p:ph type="sldImg"/>
+          </p:nvPr>
+        </p:nvSpPr>
+        <p:spPr/>
+      </p:sp>
+      <p:sp>
+        <p:nvSpPr>
+          <p:cNvPr id="3" name="Notes Placeholder 2">
+            <a:extLst>
+              <a:ext uri="{FF2B5EF4-FFF2-40B4-BE49-F238E27FC236}">
+                <a16:creationId xmlns:a16="http://schemas.microsoft.com/office/drawing/2014/main" id="{93B09F39-CD0F-30FF-0B81-3CBD82490E0A}"/>
+              </a:ext>
+            </a:extLst>
+          </p:cNvPr>
+          <p:cNvSpPr>
+            <a:spLocks noGrp="1"/>
+          </p:cNvSpPr>
+          <p:nvPr>
+            <p:ph type="body" idx="1"/>
+          </p:nvPr>
+        </p:nvSpPr>
+        <p:spPr/>
+        <p:txBody>
+          <a:bodyPr/>
+          <a:lstStyle/>
+          <a:p>
+            <a:endParaRPr lang="en-PT" dirty="0"/>
+          </a:p>
+        </p:txBody>
+      </p:sp>
+      <p:sp>
+        <p:nvSpPr>
+          <p:cNvPr id="4" name="Slide Number Placeholder 3">
+            <a:extLst>
+              <a:ext uri="{FF2B5EF4-FFF2-40B4-BE49-F238E27FC236}">
+                <a16:creationId xmlns:a16="http://schemas.microsoft.com/office/drawing/2014/main" id="{D39DD677-ECD9-CCD2-B917-934181481613}"/>
+              </a:ext>
+            </a:extLst>
+          </p:cNvPr>
+          <p:cNvSpPr>
+            <a:spLocks noGrp="1"/>
+          </p:cNvSpPr>
+          <p:nvPr>
+            <p:ph type="sldNum" sz="quarter" idx="5"/>
+          </p:nvPr>
+        </p:nvSpPr>
+        <p:spPr/>
+        <p:txBody>
+          <a:bodyPr/>
+          <a:lstStyle/>
+          <a:p>
+            <a:fld id="{F9C0959F-B939-DA40-8E66-AB7A877C2C2D}" type="slidenum">
+              <a:rPr lang="en-PT" smtClean="0"/>
+              <a:t>9</a:t>
+            </a:fld>
+            <a:endParaRPr lang="en-PT"/>
+          </a:p>
+        </p:txBody>
+      </p:sp>
+    </p:spTree>
+    <p:extLst>
+      <p:ext uri="{BB962C8B-B14F-4D97-AF65-F5344CB8AC3E}">
+        <p14:creationId xmlns:p14="http://schemas.microsoft.com/office/powerpoint/2010/main" val="1846970888"/>
+      </p:ext>
+    </p:extLst>
+  </p:cSld>
+  <p:clrMapOvr>
+    <a:masterClrMapping/>
+  </p:clrMapOvr>
+</p:notes>
+</file>
+
 <file path=ppt/slideLayouts/slideLayout1.xml><?xml version="1.0" encoding="utf-8"?>
 <p:sldLayout xmlns:a="http://schemas.openxmlformats.org/drawingml/2006/main" xmlns:r="http://schemas.openxmlformats.org/officeDocument/2006/relationships" xmlns:p="http://schemas.openxmlformats.org/presentationml/2006/main" type="title" preserve="1">
   <p:cSld name="Title Slide">
@@ -8779,7 +8888,7 @@
             </a:r>
           </a:p>
           <a:p>
-            <a:pPr algn="l">
+            <a:pPr lvl="1">
               <a:buFont typeface="Arial" panose="020B0604020202020204" pitchFamily="34" charset="0"/>
               <a:buChar char="•"/>
             </a:pPr>
@@ -8897,7 +9006,7 @@
           <a:p>
             <a:pPr algn="l"/>
             <a:r>
-              <a:rPr lang="en-GB" u="none" strike="noStrike" dirty="0">
+              <a:rPr lang="en-GB" b="1" u="none" strike="noStrike" dirty="0">
                 <a:solidFill>
                   <a:schemeClr val="bg1"/>
                 </a:solidFill>
@@ -8908,7 +9017,7 @@
               <a:t>Como </a:t>
             </a:r>
             <a:r>
-              <a:rPr lang="en-GB" u="none" strike="noStrike" dirty="0" err="1">
+              <a:rPr lang="en-GB" b="1" u="none" strike="noStrike" dirty="0" err="1">
                 <a:solidFill>
                   <a:schemeClr val="bg1"/>
                 </a:solidFill>
@@ -8919,7 +9028,7 @@
               <a:t>Funciona</a:t>
             </a:r>
             <a:r>
-              <a:rPr lang="en-GB" u="none" strike="noStrike" dirty="0">
+              <a:rPr lang="en-GB" b="1" u="none" strike="noStrike" dirty="0">
                 <a:solidFill>
                   <a:schemeClr val="bg1"/>
                 </a:solidFill>
@@ -8931,7 +9040,7 @@
             </a:r>
           </a:p>
           <a:p>
-            <a:pPr algn="l">
+            <a:pPr lvl="1">
               <a:buFont typeface="Arial" panose="020B0604020202020204" pitchFamily="34" charset="0"/>
               <a:buChar char="•"/>
             </a:pPr>
@@ -9058,7 +9167,7 @@
             </a:r>
           </a:p>
           <a:p>
-            <a:pPr algn="l">
+            <a:pPr lvl="1">
               <a:buFont typeface="Arial" panose="020B0604020202020204" pitchFamily="34" charset="0"/>
               <a:buChar char="•"/>
             </a:pPr>
@@ -9242,7 +9351,7 @@
           <a:p>
             <a:pPr algn="l"/>
             <a:r>
-              <a:rPr lang="en-GB" u="none" strike="noStrike" dirty="0">
+              <a:rPr lang="en-GB" b="1" u="none" strike="noStrike" dirty="0">
                 <a:solidFill>
                   <a:schemeClr val="bg1"/>
                 </a:solidFill>
@@ -9253,7 +9362,7 @@
               <a:t>Principal </a:t>
             </a:r>
             <a:r>
-              <a:rPr lang="en-GB" u="none" strike="noStrike" dirty="0" err="1">
+              <a:rPr lang="en-GB" b="1" u="none" strike="noStrike" dirty="0" err="1">
                 <a:solidFill>
                   <a:schemeClr val="bg1"/>
                 </a:solidFill>
@@ -9264,7 +9373,7 @@
               <a:t>Benefício</a:t>
             </a:r>
             <a:r>
-              <a:rPr lang="en-GB" u="none" strike="noStrike" dirty="0">
+              <a:rPr lang="en-GB" b="1" u="none" strike="noStrike" dirty="0">
                 <a:solidFill>
                   <a:schemeClr val="bg1"/>
                 </a:solidFill>
@@ -9276,7 +9385,7 @@
             </a:r>
           </a:p>
           <a:p>
-            <a:pPr algn="l">
+            <a:pPr lvl="1">
               <a:buFont typeface="Arial" panose="020B0604020202020204" pitchFamily="34" charset="0"/>
               <a:buChar char="•"/>
             </a:pPr>
@@ -9571,7 +9680,7 @@
             </a:r>
           </a:p>
           <a:p>
-            <a:pPr>
+            <a:pPr lvl="1">
               <a:buFont typeface="Arial" panose="020B0604020202020204" pitchFamily="34" charset="0"/>
               <a:buChar char="•"/>
             </a:pPr>
@@ -9678,7 +9787,7 @@
           </a:p>
           <a:p>
             <a:r>
-              <a:rPr lang="en-GB" dirty="0">
+              <a:rPr lang="en-GB" b="1" dirty="0">
                 <a:solidFill>
                   <a:schemeClr val="bg1"/>
                 </a:solidFill>
@@ -9688,7 +9797,7 @@
               <a:t>Como </a:t>
             </a:r>
             <a:r>
-              <a:rPr lang="en-GB" dirty="0" err="1">
+              <a:rPr lang="en-GB" b="1" dirty="0" err="1">
                 <a:solidFill>
                   <a:schemeClr val="bg1"/>
                 </a:solidFill>
@@ -9698,7 +9807,7 @@
               <a:t>Funciona</a:t>
             </a:r>
             <a:r>
-              <a:rPr lang="en-GB" dirty="0">
+              <a:rPr lang="en-GB" b="1" dirty="0">
                 <a:solidFill>
                   <a:schemeClr val="bg1"/>
                 </a:solidFill>
@@ -9709,7 +9818,7 @@
             </a:r>
           </a:p>
           <a:p>
-            <a:pPr>
+            <a:pPr lvl="1">
               <a:buFont typeface="Arial" panose="020B0604020202020204" pitchFamily="34" charset="0"/>
               <a:buChar char="•"/>
             </a:pPr>
@@ -9735,7 +9844,7 @@
             </a:r>
           </a:p>
           <a:p>
-            <a:pPr marL="0" lvl="1" indent="-285750">
+            <a:pPr marL="914400" lvl="3" indent="-285750">
               <a:buFont typeface="Arial" panose="020B0604020202020204" pitchFamily="34" charset="0"/>
               <a:buChar char="•"/>
             </a:pPr>
@@ -9781,7 +9890,7 @@
             </a:r>
           </a:p>
           <a:p>
-            <a:pPr marL="0" lvl="1" indent="-285750">
+            <a:pPr marL="914400" lvl="3" indent="-285750">
               <a:buFont typeface="Arial" panose="020B0604020202020204" pitchFamily="34" charset="0"/>
               <a:buChar char="•"/>
             </a:pPr>
@@ -9867,7 +9976,7 @@
             </a:r>
           </a:p>
           <a:p>
-            <a:pPr marL="0" lvl="1" indent="-285750">
+            <a:pPr marL="914400" lvl="3" indent="-285750">
               <a:buFont typeface="Arial" panose="020B0604020202020204" pitchFamily="34" charset="0"/>
               <a:buChar char="•"/>
             </a:pPr>
@@ -10035,7 +10144,7 @@
             </a:r>
           </a:p>
           <a:p>
-            <a:pPr>
+            <a:pPr lvl="1">
               <a:buFont typeface="Arial" panose="020B0604020202020204" pitchFamily="34" charset="0"/>
               <a:buChar char="•"/>
             </a:pPr>
@@ -10061,7 +10170,7 @@
             </a:r>
           </a:p>
           <a:p>
-            <a:pPr>
+            <a:pPr lvl="1">
               <a:buFont typeface="Arial" panose="020B0604020202020204" pitchFamily="34" charset="0"/>
               <a:buChar char="•"/>
             </a:pPr>
@@ -10107,7 +10216,7 @@
             </a:r>
           </a:p>
           <a:p>
-            <a:pPr>
+            <a:pPr lvl="1">
               <a:buFont typeface="Arial" panose="020B0604020202020204" pitchFamily="34" charset="0"/>
               <a:buChar char="•"/>
             </a:pPr>
@@ -10309,7 +10418,7 @@
         <p:spPr>
           <a:xfrm>
             <a:off x="1226524" y="2274838"/>
-            <a:ext cx="9738949" cy="2308324"/>
+            <a:ext cx="9738949" cy="2585323"/>
           </a:xfrm>
           <a:prstGeom prst="rect">
             <a:avLst/>
@@ -10344,7 +10453,7 @@
             </a:r>
           </a:p>
           <a:p>
-            <a:pPr>
+            <a:pPr lvl="1">
               <a:buFont typeface="Arial" panose="020B0604020202020204" pitchFamily="34" charset="0"/>
               <a:buChar char="•"/>
             </a:pPr>
@@ -10421,7 +10530,7 @@
           </a:p>
           <a:p>
             <a:r>
-              <a:rPr lang="en-GB" dirty="0">
+              <a:rPr lang="en-GB" b="1" dirty="0">
                 <a:solidFill>
                   <a:schemeClr val="bg1"/>
                 </a:solidFill>
@@ -10431,7 +10540,7 @@
               <a:t>Como </a:t>
             </a:r>
             <a:r>
-              <a:rPr lang="en-GB" dirty="0" err="1">
+              <a:rPr lang="en-GB" b="1" dirty="0" err="1">
                 <a:solidFill>
                   <a:schemeClr val="bg1"/>
                 </a:solidFill>
@@ -10441,7 +10550,7 @@
               <a:t>Funciona</a:t>
             </a:r>
             <a:r>
-              <a:rPr lang="en-GB" dirty="0">
+              <a:rPr lang="en-GB" b="1" dirty="0">
                 <a:solidFill>
                   <a:schemeClr val="bg1"/>
                 </a:solidFill>
@@ -10452,7 +10561,7 @@
             </a:r>
           </a:p>
           <a:p>
-            <a:pPr>
+            <a:pPr lvl="1">
               <a:buFont typeface="Arial" panose="020B0604020202020204" pitchFamily="34" charset="0"/>
               <a:buChar char="•"/>
             </a:pPr>
@@ -10670,7 +10779,7 @@
             </a:r>
           </a:p>
           <a:p>
-            <a:pPr>
+            <a:pPr lvl="1">
               <a:buFont typeface="Arial" panose="020B0604020202020204" pitchFamily="34" charset="0"/>
               <a:buChar char="•"/>
             </a:pPr>
@@ -11029,10 +11138,569 @@
           </a:graphicData>
         </a:graphic>
       </p:graphicFrame>
+      <p:sp>
+        <p:nvSpPr>
+          <p:cNvPr id="6" name="TextBox 5">
+            <a:extLst>
+              <a:ext uri="{FF2B5EF4-FFF2-40B4-BE49-F238E27FC236}">
+                <a16:creationId xmlns:a16="http://schemas.microsoft.com/office/drawing/2014/main" id="{AEF044E0-E04B-A708-0B78-F331B8B8FBD3}"/>
+              </a:ext>
+            </a:extLst>
+          </p:cNvPr>
+          <p:cNvSpPr txBox="1"/>
+          <p:nvPr/>
+        </p:nvSpPr>
+        <p:spPr>
+          <a:xfrm>
+            <a:off x="5990493" y="1243841"/>
+            <a:ext cx="6096001" cy="523220"/>
+          </a:xfrm>
+          <a:prstGeom prst="rect">
+            <a:avLst/>
+          </a:prstGeom>
+          <a:noFill/>
+        </p:spPr>
+        <p:txBody>
+          <a:bodyPr wrap="square" rtlCol="0">
+            <a:spAutoFit/>
+          </a:bodyPr>
+          <a:lstStyle/>
+          <a:p>
+            <a:pPr algn="ctr"/>
+            <a:r>
+              <a:rPr lang="en-GB" sz="2800" dirty="0">
+                <a:solidFill>
+                  <a:schemeClr val="bg1"/>
+                </a:solidFill>
+                <a:latin typeface="Calibri Light" panose="020F0302020204030204" pitchFamily="34" charset="0"/>
+                <a:cs typeface="Calibri Light" panose="020F0302020204030204" pitchFamily="34" charset="0"/>
+              </a:rPr>
+              <a:t>Testes</a:t>
+            </a:r>
+          </a:p>
+        </p:txBody>
+      </p:sp>
+      <p:sp>
+        <p:nvSpPr>
+          <p:cNvPr id="7" name="TextBox 6">
+            <a:extLst>
+              <a:ext uri="{FF2B5EF4-FFF2-40B4-BE49-F238E27FC236}">
+                <a16:creationId xmlns:a16="http://schemas.microsoft.com/office/drawing/2014/main" id="{88367CCD-CA8B-5148-E7A5-7488A0E91E81}"/>
+              </a:ext>
+            </a:extLst>
+          </p:cNvPr>
+          <p:cNvSpPr txBox="1"/>
+          <p:nvPr/>
+        </p:nvSpPr>
+        <p:spPr>
+          <a:xfrm>
+            <a:off x="6764216" y="2413337"/>
+            <a:ext cx="4548554" cy="2031325"/>
+          </a:xfrm>
+          <a:prstGeom prst="rect">
+            <a:avLst/>
+          </a:prstGeom>
+          <a:noFill/>
+        </p:spPr>
+        <p:txBody>
+          <a:bodyPr wrap="square" rtlCol="0">
+            <a:spAutoFit/>
+          </a:bodyPr>
+          <a:lstStyle/>
+          <a:p>
+            <a:pPr algn="l"/>
+            <a:r>
+              <a:rPr lang="en-GB" b="1" dirty="0" err="1">
+                <a:solidFill>
+                  <a:schemeClr val="bg1"/>
+                </a:solidFill>
+                <a:latin typeface="Calibri Light" panose="020F0302020204030204" pitchFamily="34" charset="0"/>
+                <a:cs typeface="Calibri Light" panose="020F0302020204030204" pitchFamily="34" charset="0"/>
+              </a:rPr>
+              <a:t>Cenários</a:t>
+            </a:r>
+            <a:r>
+              <a:rPr lang="en-GB" b="1" dirty="0">
+                <a:solidFill>
+                  <a:schemeClr val="bg1"/>
+                </a:solidFill>
+                <a:latin typeface="Calibri Light" panose="020F0302020204030204" pitchFamily="34" charset="0"/>
+                <a:cs typeface="Calibri Light" panose="020F0302020204030204" pitchFamily="34" charset="0"/>
+              </a:rPr>
+              <a:t> </a:t>
+            </a:r>
+            <a:r>
+              <a:rPr lang="en-GB" b="1" dirty="0" err="1">
+                <a:solidFill>
+                  <a:schemeClr val="bg1"/>
+                </a:solidFill>
+                <a:latin typeface="Calibri Light" panose="020F0302020204030204" pitchFamily="34" charset="0"/>
+                <a:cs typeface="Calibri Light" panose="020F0302020204030204" pitchFamily="34" charset="0"/>
+              </a:rPr>
+              <a:t>Testados</a:t>
+            </a:r>
+            <a:r>
+              <a:rPr lang="en-GB" b="1" dirty="0">
+                <a:solidFill>
+                  <a:schemeClr val="bg1"/>
+                </a:solidFill>
+                <a:latin typeface="Calibri Light" panose="020F0302020204030204" pitchFamily="34" charset="0"/>
+                <a:cs typeface="Calibri Light" panose="020F0302020204030204" pitchFamily="34" charset="0"/>
+              </a:rPr>
+              <a:t>:</a:t>
+            </a:r>
+          </a:p>
+          <a:p>
+            <a:pPr lvl="1">
+              <a:buFont typeface="Arial" panose="020B0604020202020204" pitchFamily="34" charset="0"/>
+              <a:buChar char="•"/>
+            </a:pPr>
+            <a:r>
+              <a:rPr lang="en-GB" dirty="0" err="1">
+                <a:solidFill>
+                  <a:schemeClr val="bg1"/>
+                </a:solidFill>
+                <a:latin typeface="Calibri Light" panose="020F0302020204030204" pitchFamily="34" charset="0"/>
+                <a:cs typeface="Calibri Light" panose="020F0302020204030204" pitchFamily="34" charset="0"/>
+              </a:rPr>
+              <a:t>Palavras</a:t>
+            </a:r>
+            <a:r>
+              <a:rPr lang="en-GB" dirty="0">
+                <a:solidFill>
+                  <a:schemeClr val="bg1"/>
+                </a:solidFill>
+                <a:latin typeface="Calibri Light" panose="020F0302020204030204" pitchFamily="34" charset="0"/>
+                <a:cs typeface="Calibri Light" panose="020F0302020204030204" pitchFamily="34" charset="0"/>
+              </a:rPr>
+              <a:t>-passe do dataset </a:t>
+            </a:r>
+            <a:r>
+              <a:rPr lang="en-GB" dirty="0" err="1">
+                <a:solidFill>
+                  <a:schemeClr val="bg1"/>
+                </a:solidFill>
+                <a:latin typeface="Calibri Light" panose="020F0302020204030204" pitchFamily="34" charset="0"/>
+                <a:cs typeface="Calibri Light" panose="020F0302020204030204" pitchFamily="34" charset="0"/>
+              </a:rPr>
+              <a:t>comprometido</a:t>
+            </a:r>
+            <a:r>
+              <a:rPr lang="en-GB" dirty="0">
+                <a:solidFill>
+                  <a:schemeClr val="bg1"/>
+                </a:solidFill>
+                <a:latin typeface="Calibri Light" panose="020F0302020204030204" pitchFamily="34" charset="0"/>
+                <a:cs typeface="Calibri Light" panose="020F0302020204030204" pitchFamily="34" charset="0"/>
+              </a:rPr>
+              <a:t>.</a:t>
+            </a:r>
+          </a:p>
+          <a:p>
+            <a:pPr lvl="1">
+              <a:buFont typeface="Arial" panose="020B0604020202020204" pitchFamily="34" charset="0"/>
+              <a:buChar char="•"/>
+            </a:pPr>
+            <a:r>
+              <a:rPr lang="en-GB" dirty="0" err="1">
+                <a:solidFill>
+                  <a:schemeClr val="bg1"/>
+                </a:solidFill>
+                <a:latin typeface="Calibri Light" panose="020F0302020204030204" pitchFamily="34" charset="0"/>
+                <a:cs typeface="Calibri Light" panose="020F0302020204030204" pitchFamily="34" charset="0"/>
+              </a:rPr>
+              <a:t>Palavras</a:t>
+            </a:r>
+            <a:r>
+              <a:rPr lang="en-GB" dirty="0">
+                <a:solidFill>
+                  <a:schemeClr val="bg1"/>
+                </a:solidFill>
+                <a:latin typeface="Calibri Light" panose="020F0302020204030204" pitchFamily="34" charset="0"/>
+                <a:cs typeface="Calibri Light" panose="020F0302020204030204" pitchFamily="34" charset="0"/>
+              </a:rPr>
+              <a:t>-passe com </a:t>
+            </a:r>
+            <a:r>
+              <a:rPr lang="en-GB" dirty="0" err="1">
+                <a:solidFill>
+                  <a:schemeClr val="bg1"/>
+                </a:solidFill>
+                <a:latin typeface="Calibri Light" panose="020F0302020204030204" pitchFamily="34" charset="0"/>
+                <a:cs typeface="Calibri Light" panose="020F0302020204030204" pitchFamily="34" charset="0"/>
+              </a:rPr>
+              <a:t>caracteres</a:t>
+            </a:r>
+            <a:r>
+              <a:rPr lang="en-GB" dirty="0">
+                <a:solidFill>
+                  <a:schemeClr val="bg1"/>
+                </a:solidFill>
+                <a:latin typeface="Calibri Light" panose="020F0302020204030204" pitchFamily="34" charset="0"/>
+                <a:cs typeface="Calibri Light" panose="020F0302020204030204" pitchFamily="34" charset="0"/>
+              </a:rPr>
+              <a:t> </a:t>
+            </a:r>
+            <a:r>
+              <a:rPr lang="en-GB" dirty="0" err="1">
+                <a:solidFill>
+                  <a:schemeClr val="bg1"/>
+                </a:solidFill>
+                <a:latin typeface="Calibri Light" panose="020F0302020204030204" pitchFamily="34" charset="0"/>
+                <a:cs typeface="Calibri Light" panose="020F0302020204030204" pitchFamily="34" charset="0"/>
+              </a:rPr>
+              <a:t>incomuns</a:t>
+            </a:r>
+            <a:r>
+              <a:rPr lang="en-GB" dirty="0">
+                <a:solidFill>
+                  <a:schemeClr val="bg1"/>
+                </a:solidFill>
+                <a:latin typeface="Calibri Light" panose="020F0302020204030204" pitchFamily="34" charset="0"/>
+                <a:cs typeface="Calibri Light" panose="020F0302020204030204" pitchFamily="34" charset="0"/>
+              </a:rPr>
+              <a:t> </a:t>
+            </a:r>
+            <a:r>
+              <a:rPr lang="en-GB" dirty="0" err="1">
+                <a:solidFill>
+                  <a:schemeClr val="bg1"/>
+                </a:solidFill>
+                <a:latin typeface="Calibri Light" panose="020F0302020204030204" pitchFamily="34" charset="0"/>
+                <a:cs typeface="Calibri Light" panose="020F0302020204030204" pitchFamily="34" charset="0"/>
+              </a:rPr>
+              <a:t>ou</a:t>
+            </a:r>
+            <a:r>
+              <a:rPr lang="en-GB" dirty="0">
+                <a:solidFill>
+                  <a:schemeClr val="bg1"/>
+                </a:solidFill>
+                <a:latin typeface="Calibri Light" panose="020F0302020204030204" pitchFamily="34" charset="0"/>
+                <a:cs typeface="Calibri Light" panose="020F0302020204030204" pitchFamily="34" charset="0"/>
+              </a:rPr>
+              <a:t> </a:t>
+            </a:r>
+            <a:r>
+              <a:rPr lang="en-GB" dirty="0" err="1">
+                <a:solidFill>
+                  <a:schemeClr val="bg1"/>
+                </a:solidFill>
+                <a:latin typeface="Calibri Light" panose="020F0302020204030204" pitchFamily="34" charset="0"/>
+                <a:cs typeface="Calibri Light" panose="020F0302020204030204" pitchFamily="34" charset="0"/>
+              </a:rPr>
+              <a:t>especiais</a:t>
+            </a:r>
+            <a:r>
+              <a:rPr lang="en-GB" dirty="0">
+                <a:solidFill>
+                  <a:schemeClr val="bg1"/>
+                </a:solidFill>
+                <a:latin typeface="Calibri Light" panose="020F0302020204030204" pitchFamily="34" charset="0"/>
+                <a:cs typeface="Calibri Light" panose="020F0302020204030204" pitchFamily="34" charset="0"/>
+              </a:rPr>
+              <a:t>.</a:t>
+            </a:r>
+          </a:p>
+          <a:p>
+            <a:pPr lvl="1">
+              <a:buFont typeface="Arial" panose="020B0604020202020204" pitchFamily="34" charset="0"/>
+              <a:buChar char="•"/>
+            </a:pPr>
+            <a:r>
+              <a:rPr lang="en-GB" dirty="0" err="1">
+                <a:solidFill>
+                  <a:schemeClr val="bg1"/>
+                </a:solidFill>
+                <a:latin typeface="Calibri Light" panose="020F0302020204030204" pitchFamily="34" charset="0"/>
+                <a:cs typeface="Calibri Light" panose="020F0302020204030204" pitchFamily="34" charset="0"/>
+              </a:rPr>
+              <a:t>Palavras</a:t>
+            </a:r>
+            <a:r>
+              <a:rPr lang="en-GB" dirty="0">
+                <a:solidFill>
+                  <a:schemeClr val="bg1"/>
+                </a:solidFill>
+                <a:latin typeface="Calibri Light" panose="020F0302020204030204" pitchFamily="34" charset="0"/>
+                <a:cs typeface="Calibri Light" panose="020F0302020204030204" pitchFamily="34" charset="0"/>
+              </a:rPr>
+              <a:t>-passe </a:t>
+            </a:r>
+            <a:r>
+              <a:rPr lang="en-GB" dirty="0" err="1">
+                <a:solidFill>
+                  <a:schemeClr val="bg1"/>
+                </a:solidFill>
+                <a:latin typeface="Calibri Light" panose="020F0302020204030204" pitchFamily="34" charset="0"/>
+                <a:cs typeface="Calibri Light" panose="020F0302020204030204" pitchFamily="34" charset="0"/>
+              </a:rPr>
+              <a:t>completamente</a:t>
+            </a:r>
+            <a:r>
+              <a:rPr lang="en-GB" dirty="0">
+                <a:solidFill>
+                  <a:schemeClr val="bg1"/>
+                </a:solidFill>
+                <a:latin typeface="Calibri Light" panose="020F0302020204030204" pitchFamily="34" charset="0"/>
+                <a:cs typeface="Calibri Light" panose="020F0302020204030204" pitchFamily="34" charset="0"/>
+              </a:rPr>
+              <a:t> </a:t>
+            </a:r>
+            <a:r>
+              <a:rPr lang="en-GB" dirty="0" err="1">
+                <a:solidFill>
+                  <a:schemeClr val="bg1"/>
+                </a:solidFill>
+                <a:latin typeface="Calibri Light" panose="020F0302020204030204" pitchFamily="34" charset="0"/>
+                <a:cs typeface="Calibri Light" panose="020F0302020204030204" pitchFamily="34" charset="0"/>
+              </a:rPr>
+              <a:t>únicas</a:t>
+            </a:r>
+            <a:r>
+              <a:rPr lang="en-GB" dirty="0">
+                <a:solidFill>
+                  <a:schemeClr val="bg1"/>
+                </a:solidFill>
+                <a:latin typeface="Calibri Light" panose="020F0302020204030204" pitchFamily="34" charset="0"/>
+                <a:cs typeface="Calibri Light" panose="020F0302020204030204" pitchFamily="34" charset="0"/>
+              </a:rPr>
+              <a:t>.</a:t>
+            </a:r>
+          </a:p>
+          <a:p>
+            <a:pPr algn="l"/>
+            <a:r>
+              <a:rPr lang="en-GB" b="1" dirty="0" err="1">
+                <a:solidFill>
+                  <a:schemeClr val="bg1"/>
+                </a:solidFill>
+                <a:latin typeface="Calibri Light" panose="020F0302020204030204" pitchFamily="34" charset="0"/>
+                <a:cs typeface="Calibri Light" panose="020F0302020204030204" pitchFamily="34" charset="0"/>
+              </a:rPr>
+              <a:t>Métricas</a:t>
+            </a:r>
+            <a:r>
+              <a:rPr lang="en-GB" b="1" dirty="0">
+                <a:solidFill>
+                  <a:schemeClr val="bg1"/>
+                </a:solidFill>
+                <a:latin typeface="Calibri Light" panose="020F0302020204030204" pitchFamily="34" charset="0"/>
+                <a:cs typeface="Calibri Light" panose="020F0302020204030204" pitchFamily="34" charset="0"/>
+              </a:rPr>
+              <a:t>:</a:t>
+            </a:r>
+          </a:p>
+          <a:p>
+            <a:pPr lvl="1">
+              <a:buFont typeface="Arial" panose="020B0604020202020204" pitchFamily="34" charset="0"/>
+              <a:buChar char="•"/>
+            </a:pPr>
+            <a:r>
+              <a:rPr lang="en-GB" dirty="0">
+                <a:solidFill>
+                  <a:schemeClr val="bg1"/>
+                </a:solidFill>
+                <a:latin typeface="Calibri Light" panose="020F0302020204030204" pitchFamily="34" charset="0"/>
+                <a:cs typeface="Calibri Light" panose="020F0302020204030204" pitchFamily="34" charset="0"/>
+              </a:rPr>
+              <a:t>Accuracy, Precision, Recall e F1.</a:t>
+            </a:r>
+          </a:p>
+        </p:txBody>
+      </p:sp>
     </p:spTree>
     <p:extLst>
       <p:ext uri="{BB962C8B-B14F-4D97-AF65-F5344CB8AC3E}">
         <p14:creationId xmlns:p14="http://schemas.microsoft.com/office/powerpoint/2010/main" val="2913319095"/>
+      </p:ext>
+    </p:extLst>
+  </p:cSld>
+  <p:clrMapOvr>
+    <a:masterClrMapping/>
+  </p:clrMapOvr>
+</p:sld>
+</file>
+
+<file path=ppt/slides/slide9.xml><?xml version="1.0" encoding="utf-8"?>
+<p:sld xmlns:a="http://schemas.openxmlformats.org/drawingml/2006/main" xmlns:r="http://schemas.openxmlformats.org/officeDocument/2006/relationships" xmlns:p="http://schemas.openxmlformats.org/presentationml/2006/main">
+  <p:cSld>
+    <p:bg>
+      <p:bgPr>
+        <a:solidFill>
+          <a:srgbClr val="091430"/>
+        </a:solidFill>
+        <a:effectLst/>
+      </p:bgPr>
+    </p:bg>
+    <p:spTree>
+      <p:nvGrpSpPr>
+        <p:cNvPr id="1" name="">
+          <a:extLst>
+            <a:ext uri="{FF2B5EF4-FFF2-40B4-BE49-F238E27FC236}">
+              <a16:creationId xmlns:a16="http://schemas.microsoft.com/office/drawing/2014/main" id="{BD57A9DD-9BFF-1399-1DBC-8077B636355D}"/>
+            </a:ext>
+          </a:extLst>
+        </p:cNvPr>
+        <p:cNvGrpSpPr/>
+        <p:nvPr/>
+      </p:nvGrpSpPr>
+      <p:grpSpPr>
+        <a:xfrm>
+          <a:off x="0" y="0"/>
+          <a:ext cx="0" cy="0"/>
+          <a:chOff x="0" y="0"/>
+          <a:chExt cx="0" cy="0"/>
+        </a:xfrm>
+      </p:grpSpPr>
+      <p:sp>
+        <p:nvSpPr>
+          <p:cNvPr id="4" name="TextBox 3">
+            <a:extLst>
+              <a:ext uri="{FF2B5EF4-FFF2-40B4-BE49-F238E27FC236}">
+                <a16:creationId xmlns:a16="http://schemas.microsoft.com/office/drawing/2014/main" id="{C630D51B-A7E7-2754-13BB-D94AABB8D163}"/>
+              </a:ext>
+            </a:extLst>
+          </p:cNvPr>
+          <p:cNvSpPr txBox="1"/>
+          <p:nvPr/>
+        </p:nvSpPr>
+        <p:spPr>
+          <a:xfrm>
+            <a:off x="4548553" y="480647"/>
+            <a:ext cx="3094893" cy="369332"/>
+          </a:xfrm>
+          <a:prstGeom prst="rect">
+            <a:avLst/>
+          </a:prstGeom>
+          <a:noFill/>
+        </p:spPr>
+        <p:txBody>
+          <a:bodyPr wrap="square" rtlCol="0">
+            <a:spAutoFit/>
+          </a:bodyPr>
+          <a:lstStyle/>
+          <a:p>
+            <a:pPr algn="ctr"/>
+            <a:r>
+              <a:rPr lang="en-PT" dirty="0">
+                <a:solidFill>
+                  <a:schemeClr val="bg1"/>
+                </a:solidFill>
+                <a:latin typeface="Calibri Light" panose="020F0302020204030204" pitchFamily="34" charset="0"/>
+                <a:cs typeface="Calibri Light" panose="020F0302020204030204" pitchFamily="34" charset="0"/>
+              </a:rPr>
+              <a:t>8. Referências </a:t>
+            </a:r>
+          </a:p>
+        </p:txBody>
+      </p:sp>
+      <p:sp>
+        <p:nvSpPr>
+          <p:cNvPr id="3" name="TextBox 2">
+            <a:extLst>
+              <a:ext uri="{FF2B5EF4-FFF2-40B4-BE49-F238E27FC236}">
+                <a16:creationId xmlns:a16="http://schemas.microsoft.com/office/drawing/2014/main" id="{BC469A90-0ED9-0C94-DFEF-CC5A6D9A5EA1}"/>
+              </a:ext>
+            </a:extLst>
+          </p:cNvPr>
+          <p:cNvSpPr txBox="1"/>
+          <p:nvPr/>
+        </p:nvSpPr>
+        <p:spPr>
+          <a:xfrm>
+            <a:off x="1226524" y="2274838"/>
+            <a:ext cx="9738949" cy="1200329"/>
+          </a:xfrm>
+          <a:prstGeom prst="rect">
+            <a:avLst/>
+          </a:prstGeom>
+          <a:noFill/>
+        </p:spPr>
+        <p:txBody>
+          <a:bodyPr wrap="square" rtlCol="0">
+            <a:spAutoFit/>
+          </a:bodyPr>
+          <a:lstStyle/>
+          <a:p>
+            <a:pPr marL="285750" indent="-285750" algn="l">
+              <a:buFont typeface="Arial" panose="020B0604020202020204" pitchFamily="34" charset="0"/>
+              <a:buChar char="•"/>
+            </a:pPr>
+            <a:r>
+              <a:rPr lang="en-GB" dirty="0">
+                <a:solidFill>
+                  <a:schemeClr val="bg1"/>
+                </a:solidFill>
+                <a:latin typeface="Calibri Light" panose="020F0302020204030204" pitchFamily="34" charset="0"/>
+                <a:cs typeface="Calibri Light" panose="020F0302020204030204" pitchFamily="34" charset="0"/>
+                <a:hlinkClick r:id="rId3">
+                  <a:extLst>
+                    <a:ext uri="{A12FA001-AC4F-418D-AE19-62706E023703}">
+                      <ahyp:hlinkClr xmlns:ahyp="http://schemas.microsoft.com/office/drawing/2018/hyperlinkcolor" val="tx"/>
+                    </a:ext>
+                  </a:extLst>
+                </a:hlinkClick>
+              </a:rPr>
+              <a:t>https://github.com/OWASP/passfault/blob/master/wordlists/wordlists/10k-worst-passwords.tx</a:t>
+            </a:r>
+            <a:r>
+              <a:rPr lang="en-GB" dirty="0">
+                <a:solidFill>
+                  <a:schemeClr val="bg1"/>
+                </a:solidFill>
+                <a:latin typeface="Calibri Light" panose="020F0302020204030204" pitchFamily="34" charset="0"/>
+                <a:cs typeface="Calibri Light" panose="020F0302020204030204" pitchFamily="34" charset="0"/>
+              </a:rPr>
+              <a:t>t</a:t>
+            </a:r>
+          </a:p>
+          <a:p>
+            <a:pPr marL="285750" indent="-285750">
+              <a:buFont typeface="Arial" panose="020B0604020202020204" pitchFamily="34" charset="0"/>
+              <a:buChar char="•"/>
+            </a:pPr>
+            <a:r>
+              <a:rPr lang="en-GB" dirty="0">
+                <a:solidFill>
+                  <a:schemeClr val="bg1"/>
+                </a:solidFill>
+                <a:latin typeface="Calibri Light" panose="020F0302020204030204" pitchFamily="34" charset="0"/>
+                <a:cs typeface="Calibri Light" panose="020F0302020204030204" pitchFamily="34" charset="0"/>
+                <a:hlinkClick r:id="rId4">
+                  <a:extLst>
+                    <a:ext uri="{A12FA001-AC4F-418D-AE19-62706E023703}">
+                      <ahyp:hlinkClr xmlns:ahyp="http://schemas.microsoft.com/office/drawing/2018/hyperlinkcolor" val="tx"/>
+                    </a:ext>
+                  </a:extLst>
+                </a:hlinkClick>
+              </a:rPr>
+              <a:t>https://storage.googleapis.com/gweb-uniblog-publish-prod/documents/PasswordCheckup-HarrisPoll-InfographicFINAL.pdf</a:t>
+            </a:r>
+            <a:endParaRPr lang="en-GB" dirty="0">
+              <a:solidFill>
+                <a:schemeClr val="bg1"/>
+              </a:solidFill>
+              <a:latin typeface="Calibri Light" panose="020F0302020204030204" pitchFamily="34" charset="0"/>
+              <a:cs typeface="Calibri Light" panose="020F0302020204030204" pitchFamily="34" charset="0"/>
+            </a:endParaRPr>
+          </a:p>
+          <a:p>
+            <a:pPr algn="l"/>
+            <a:endParaRPr lang="en-GB" dirty="0">
+              <a:solidFill>
+                <a:schemeClr val="bg1"/>
+              </a:solidFill>
+              <a:latin typeface="Calibri Light" panose="020F0302020204030204" pitchFamily="34" charset="0"/>
+              <a:cs typeface="Calibri Light" panose="020F0302020204030204" pitchFamily="34" charset="0"/>
+            </a:endParaRPr>
+          </a:p>
+        </p:txBody>
+      </p:sp>
+    </p:spTree>
+    <p:extLst>
+      <p:ext uri="{BB962C8B-B14F-4D97-AF65-F5344CB8AC3E}">
+        <p14:creationId xmlns:p14="http://schemas.microsoft.com/office/powerpoint/2010/main" val="4180995857"/>
       </p:ext>
     </p:extLst>
   </p:cSld>

</xml_diff>